<commit_message>
Update AIM Autonomous Intersection Management.pptx
</commit_message>
<xml_diff>
--- a/AIM Autonomous Intersection Management.pptx
+++ b/AIM Autonomous Intersection Management.pptx
@@ -11,6 +11,7 @@
     <p:sldId id="259" r:id="rId5"/>
     <p:sldId id="260" r:id="rId6"/>
     <p:sldId id="261" r:id="rId7"/>
+    <p:sldId id="262" r:id="rId8"/>
   </p:sldIdLst>
   <p:sldSz cx="12192000" cy="6858000"/>
   <p:notesSz cx="6858000" cy="9144000"/>
@@ -15973,6 +15974,192 @@
 </p:sld>
 </file>
 
+<file path=ppt/slides/slide7.xml><?xml version="1.0" encoding="utf-8"?>
+<p:sld xmlns:a="http://schemas.openxmlformats.org/drawingml/2006/main" xmlns:r="http://schemas.openxmlformats.org/officeDocument/2006/relationships" xmlns:p="http://schemas.openxmlformats.org/presentationml/2006/main">
+  <p:cSld>
+    <p:bg>
+      <p:bgPr>
+        <a:solidFill>
+          <a:schemeClr val="bg1"/>
+        </a:solidFill>
+        <a:effectLst/>
+      </p:bgPr>
+    </p:bg>
+    <p:spTree>
+      <p:nvGrpSpPr>
+        <p:cNvPr id="1" name=""/>
+        <p:cNvGrpSpPr/>
+        <p:nvPr/>
+      </p:nvGrpSpPr>
+      <p:grpSpPr>
+        <a:xfrm>
+          <a:off x="0" y="0"/>
+          <a:ext cx="0" cy="0"/>
+          <a:chOff x="0" y="0"/>
+          <a:chExt cx="0" cy="0"/>
+        </a:xfrm>
+      </p:grpSpPr>
+      <p:sp>
+        <p:nvSpPr>
+          <p:cNvPr id="10" name="Down Arrow 7">
+            <a:extLst>
+              <a:ext uri="{FF2B5EF4-FFF2-40B4-BE49-F238E27FC236}">
+                <a16:creationId xmlns:a16="http://schemas.microsoft.com/office/drawing/2014/main" id="{D4771268-CB57-404A-9271-370EB28F6090}"/>
+              </a:ext>
+              <a:ext uri="{C183D7F6-B498-43B3-948B-1728B52AA6E4}">
+                <adec:decorative xmlns:adec="http://schemas.microsoft.com/office/drawing/2017/decorative" val="1"/>
+              </a:ext>
+            </a:extLst>
+          </p:cNvPr>
+          <p:cNvSpPr>
+            <a:spLocks noGrp="1" noRot="1" noChangeAspect="1" noMove="1" noResize="1" noEditPoints="1" noAdjustHandles="1" noChangeArrowheads="1" noChangeShapeType="1" noTextEdit="1"/>
+          </p:cNvSpPr>
+          <p:nvPr>
+            <p:extLst>
+              <p:ext uri="{386F3935-93C4-4BCD-93E2-E3B085C9AB24}">
+                <p16:designElem xmlns:p16="http://schemas.microsoft.com/office/powerpoint/2015/main" val="1"/>
+              </p:ext>
+            </p:extLst>
+          </p:nvPr>
+        </p:nvSpPr>
+        <p:spPr>
+          <a:xfrm rot="16200000">
+            <a:off x="800100" y="1491343"/>
+            <a:ext cx="3333749" cy="3499103"/>
+          </a:xfrm>
+          <a:prstGeom prst="downArrow">
+            <a:avLst>
+              <a:gd name="adj1" fmla="val 100000"/>
+              <a:gd name="adj2" fmla="val 15788"/>
+            </a:avLst>
+          </a:prstGeom>
+          <a:solidFill>
+            <a:srgbClr val="404040"/>
+          </a:solidFill>
+          <a:ln w="53975">
+            <a:noFill/>
+          </a:ln>
+        </p:spPr>
+        <p:style>
+          <a:lnRef idx="2">
+            <a:schemeClr val="accent1">
+              <a:shade val="50000"/>
+            </a:schemeClr>
+          </a:lnRef>
+          <a:fillRef idx="1">
+            <a:schemeClr val="accent1"/>
+          </a:fillRef>
+          <a:effectRef idx="0">
+            <a:schemeClr val="accent1"/>
+          </a:effectRef>
+          <a:fontRef idx="minor">
+            <a:schemeClr val="lt1"/>
+          </a:fontRef>
+        </p:style>
+        <p:txBody>
+          <a:bodyPr rtlCol="0" anchor="ctr"/>
+          <a:lstStyle/>
+          <a:p>
+            <a:pPr algn="ctr"/>
+            <a:endParaRPr lang="en-US"/>
+          </a:p>
+        </p:txBody>
+      </p:sp>
+      <p:sp>
+        <p:nvSpPr>
+          <p:cNvPr id="2" name="Title 1">
+            <a:extLst>
+              <a:ext uri="{FF2B5EF4-FFF2-40B4-BE49-F238E27FC236}">
+                <a16:creationId xmlns:a16="http://schemas.microsoft.com/office/drawing/2014/main" id="{9EAD5502-3DB4-4523-8EEB-A424ED2B6075}"/>
+              </a:ext>
+            </a:extLst>
+          </p:cNvPr>
+          <p:cNvSpPr>
+            <a:spLocks noGrp="1"/>
+          </p:cNvSpPr>
+          <p:nvPr>
+            <p:ph type="title"/>
+          </p:nvPr>
+        </p:nvSpPr>
+        <p:spPr>
+          <a:xfrm>
+            <a:off x="1028700" y="1967266"/>
+            <a:ext cx="2628900" cy="2547257"/>
+          </a:xfrm>
+          <a:noFill/>
+        </p:spPr>
+        <p:txBody>
+          <a:bodyPr vert="horz" lIns="91440" tIns="45720" rIns="91440" bIns="45720" rtlCol="0" anchor="ctr">
+            <a:normAutofit/>
+          </a:bodyPr>
+          <a:lstStyle/>
+          <a:p>
+            <a:pPr algn="ctr"/>
+            <a:r>
+              <a:rPr lang="en-US" sz="3600" kern="1200" dirty="0">
+                <a:solidFill>
+                  <a:srgbClr val="FFFFFF"/>
+                </a:solidFill>
+                <a:latin typeface="+mj-lt"/>
+                <a:ea typeface="+mj-ea"/>
+                <a:cs typeface="+mj-cs"/>
+              </a:rPr>
+              <a:t>Requirement Diagram</a:t>
+            </a:r>
+          </a:p>
+        </p:txBody>
+      </p:sp>
+      <p:pic>
+        <p:nvPicPr>
+          <p:cNvPr id="5" name="Content Placeholder 4" descr="Diagram&#10;&#10;Description automatically generated">
+            <a:extLst>
+              <a:ext uri="{FF2B5EF4-FFF2-40B4-BE49-F238E27FC236}">
+                <a16:creationId xmlns:a16="http://schemas.microsoft.com/office/drawing/2014/main" id="{181D3C72-7A57-4CC4-B050-DF00F08B129C}"/>
+              </a:ext>
+            </a:extLst>
+          </p:cNvPr>
+          <p:cNvPicPr>
+            <a:picLocks noGrp="1" noChangeAspect="1"/>
+          </p:cNvPicPr>
+          <p:nvPr>
+            <p:ph idx="1"/>
+          </p:nvPr>
+        </p:nvPicPr>
+        <p:blipFill>
+          <a:blip r:embed="rId2">
+            <a:extLst>
+              <a:ext uri="{28A0092B-C50C-407E-A947-70E740481C1C}">
+                <a14:useLocalDpi xmlns:a14="http://schemas.microsoft.com/office/drawing/2010/main" val="0"/>
+              </a:ext>
+            </a:extLst>
+          </a:blip>
+          <a:stretch>
+            <a:fillRect/>
+          </a:stretch>
+        </p:blipFill>
+        <p:spPr>
+          <a:xfrm>
+            <a:off x="4777316" y="800315"/>
+            <a:ext cx="6780700" cy="5255041"/>
+          </a:xfrm>
+          <a:prstGeom prst="rect">
+            <a:avLst/>
+          </a:prstGeom>
+        </p:spPr>
+      </p:pic>
+    </p:spTree>
+    <p:extLst>
+      <p:ext uri="{BB962C8B-B14F-4D97-AF65-F5344CB8AC3E}">
+        <p14:creationId xmlns:p14="http://schemas.microsoft.com/office/powerpoint/2010/main" val="2202099191"/>
+      </p:ext>
+    </p:extLst>
+  </p:cSld>
+  <p:clrMapOvr>
+    <a:masterClrMapping/>
+  </p:clrMapOvr>
+</p:sld>
+</file>
+
 <file path=ppt/theme/theme1.xml><?xml version="1.0" encoding="utf-8"?>
 <a:theme xmlns:a="http://schemas.openxmlformats.org/drawingml/2006/main" name="Office Theme">
   <a:themeElements>

</xml_diff>